<commit_message>
Modify display sequence digram
</commit_message>
<xml_diff>
--- a/docs/diagrams/DisplaySequenceDiagram.pptx
+++ b/docs/diagrams/DisplaySequenceDiagram.pptx
@@ -208,7 +208,7 @@
           <a:p>
             <a:fld id="{F5CC4B3F-88C1-4FFA-B1B6-F41C21DC6924}" type="datetimeFigureOut">
               <a:rPr lang="en-US" smtClean="0"/>
-              <a:t>3/19/2019</a:t>
+              <a:t>4/15/2019</a:t>
             </a:fld>
             <a:endParaRPr lang="en-US"/>
           </a:p>
@@ -654,7 +654,7 @@
           <a:p>
             <a:fld id="{78C97017-6FC3-485B-9764-EAC9E56C1D49}" type="datetimeFigureOut">
               <a:rPr lang="en-US" smtClean="0"/>
-              <a:t>3/19/2019</a:t>
+              <a:t>4/15/2019</a:t>
             </a:fld>
             <a:endParaRPr lang="en-US"/>
           </a:p>
@@ -822,7 +822,7 @@
           <a:p>
             <a:fld id="{78C97017-6FC3-485B-9764-EAC9E56C1D49}" type="datetimeFigureOut">
               <a:rPr lang="en-US" smtClean="0"/>
-              <a:t>3/19/2019</a:t>
+              <a:t>4/15/2019</a:t>
             </a:fld>
             <a:endParaRPr lang="en-US"/>
           </a:p>
@@ -1000,7 +1000,7 @@
           <a:p>
             <a:fld id="{78C97017-6FC3-485B-9764-EAC9E56C1D49}" type="datetimeFigureOut">
               <a:rPr lang="en-US" smtClean="0"/>
-              <a:t>3/19/2019</a:t>
+              <a:t>4/15/2019</a:t>
             </a:fld>
             <a:endParaRPr lang="en-US"/>
           </a:p>
@@ -1168,7 +1168,7 @@
           <a:p>
             <a:fld id="{78C97017-6FC3-485B-9764-EAC9E56C1D49}" type="datetimeFigureOut">
               <a:rPr lang="en-US" smtClean="0"/>
-              <a:t>3/19/2019</a:t>
+              <a:t>4/15/2019</a:t>
             </a:fld>
             <a:endParaRPr lang="en-US"/>
           </a:p>
@@ -1413,7 +1413,7 @@
           <a:p>
             <a:fld id="{78C97017-6FC3-485B-9764-EAC9E56C1D49}" type="datetimeFigureOut">
               <a:rPr lang="en-US" smtClean="0"/>
-              <a:t>3/19/2019</a:t>
+              <a:t>4/15/2019</a:t>
             </a:fld>
             <a:endParaRPr lang="en-US"/>
           </a:p>
@@ -1698,7 +1698,7 @@
           <a:p>
             <a:fld id="{78C97017-6FC3-485B-9764-EAC9E56C1D49}" type="datetimeFigureOut">
               <a:rPr lang="en-US" smtClean="0"/>
-              <a:t>3/19/2019</a:t>
+              <a:t>4/15/2019</a:t>
             </a:fld>
             <a:endParaRPr lang="en-US"/>
           </a:p>
@@ -2117,7 +2117,7 @@
           <a:p>
             <a:fld id="{78C97017-6FC3-485B-9764-EAC9E56C1D49}" type="datetimeFigureOut">
               <a:rPr lang="en-US" smtClean="0"/>
-              <a:t>3/19/2019</a:t>
+              <a:t>4/15/2019</a:t>
             </a:fld>
             <a:endParaRPr lang="en-US"/>
           </a:p>
@@ -2234,7 +2234,7 @@
           <a:p>
             <a:fld id="{78C97017-6FC3-485B-9764-EAC9E56C1D49}" type="datetimeFigureOut">
               <a:rPr lang="en-US" smtClean="0"/>
-              <a:t>3/19/2019</a:t>
+              <a:t>4/15/2019</a:t>
             </a:fld>
             <a:endParaRPr lang="en-US"/>
           </a:p>
@@ -2329,7 +2329,7 @@
           <a:p>
             <a:fld id="{78C97017-6FC3-485B-9764-EAC9E56C1D49}" type="datetimeFigureOut">
               <a:rPr lang="en-US" smtClean="0"/>
-              <a:t>3/19/2019</a:t>
+              <a:t>4/15/2019</a:t>
             </a:fld>
             <a:endParaRPr lang="en-US"/>
           </a:p>
@@ -2604,7 +2604,7 @@
           <a:p>
             <a:fld id="{78C97017-6FC3-485B-9764-EAC9E56C1D49}" type="datetimeFigureOut">
               <a:rPr lang="en-US" smtClean="0"/>
-              <a:t>3/19/2019</a:t>
+              <a:t>4/15/2019</a:t>
             </a:fld>
             <a:endParaRPr lang="en-US"/>
           </a:p>
@@ -2856,7 +2856,7 @@
           <a:p>
             <a:fld id="{78C97017-6FC3-485B-9764-EAC9E56C1D49}" type="datetimeFigureOut">
               <a:rPr lang="en-US" smtClean="0"/>
-              <a:t>3/19/2019</a:t>
+              <a:t>4/15/2019</a:t>
             </a:fld>
             <a:endParaRPr lang="en-US"/>
           </a:p>
@@ -3067,7 +3067,7 @@
           <a:p>
             <a:fld id="{78C97017-6FC3-485B-9764-EAC9E56C1D49}" type="datetimeFigureOut">
               <a:rPr lang="en-US" smtClean="0"/>
-              <a:t>3/19/2019</a:t>
+              <a:t>4/15/2019</a:t>
             </a:fld>
             <a:endParaRPr lang="en-US"/>
           </a:p>
@@ -3457,9 +3457,9 @@
         <p:grpSpPr>
           <a:xfrm>
             <a:off x="358464" y="2870994"/>
-            <a:ext cx="13683284" cy="8491710"/>
+            <a:ext cx="13792440" cy="8491710"/>
             <a:chOff x="642316" y="118894"/>
-            <a:chExt cx="13683284" cy="8491710"/>
+            <a:chExt cx="13792440" cy="8491710"/>
           </a:xfrm>
         </p:grpSpPr>
         <p:sp>
@@ -5715,8 +5715,8 @@
           </p:nvSpPr>
           <p:spPr>
             <a:xfrm>
-              <a:off x="873252" y="4724403"/>
-              <a:ext cx="11391354" cy="2053557"/>
+              <a:off x="873251" y="4724403"/>
+              <a:ext cx="13561505" cy="2053557"/>
             </a:xfrm>
             <a:prstGeom prst="rect">
               <a:avLst/>

</xml_diff>